<commit_message>
pushing notes for tonight's class
</commit_message>
<xml_diff>
--- a/lectures/Business Rules.pptx
+++ b/lectures/Business Rules.pptx
@@ -17274,8 +17274,13 @@
             </a:pPr>
             <a:r>
               <a:rPr lang="en-US" dirty="0"/>
-              <a:t>(There ought to be an explicit motivation for the rules, as well as enforcement methods and an understanding of what the consequences would be if the rule were broken.)</a:t>
-            </a:r>
+              <a:t>(There ought to be an explicit motivation for the rules, as well as enforcement methods and an understanding of what the consequences would be if the rule </a:t>
+            </a:r>
+            <a:r>
+              <a:rPr lang="en-US"/>
+              <a:t>were broken.)</a:t>
+            </a:r>
+            <a:endParaRPr lang="en-US" dirty="0"/>
           </a:p>
           <a:p>
             <a:pPr marL="457200" lvl="1" indent="0">
@@ -17355,7 +17360,7 @@
           <a:lstStyle/>
           <a:p>
             <a:r>
-              <a:rPr lang="en-US"/>
+              <a:rPr lang="en-US" dirty="0"/>
               <a:t>Quiz 2</a:t>
             </a:r>
           </a:p>
@@ -17385,14 +17390,14 @@
             <a:pPr marL="0" indent="0">
               <a:buNone/>
             </a:pPr>
-            <a:endParaRPr lang="en-US"/>
+            <a:endParaRPr lang="en-US" dirty="0"/>
           </a:p>
           <a:p>
             <a:pPr marL="0" indent="0">
               <a:buNone/>
             </a:pPr>
             <a:r>
-              <a:rPr lang="en-US"/>
+              <a:rPr lang="en-US" dirty="0"/>
               <a:t>Elaborate the following user story with (at least one) use case. Include at least one alternate flow / extension. Use canonical use case form.</a:t>
             </a:r>
           </a:p>
@@ -17400,14 +17405,14 @@
             <a:pPr marL="0" indent="0">
               <a:buNone/>
             </a:pPr>
-            <a:endParaRPr lang="en-US"/>
+            <a:endParaRPr lang="en-US" dirty="0"/>
           </a:p>
           <a:p>
             <a:pPr marL="0" indent="0" algn="ctr">
               <a:buNone/>
             </a:pPr>
             <a:r>
-              <a:rPr lang="en-US" i="1"/>
+              <a:rPr lang="en-US" i="1" dirty="0"/>
               <a:t>As a recruiter, I can pay for a job posting with a credit card.</a:t>
             </a:r>
           </a:p>
@@ -17415,13 +17420,13 @@
             <a:pPr marL="0" indent="0" algn="ctr">
               <a:buNone/>
             </a:pPr>
-            <a:endParaRPr lang="en-US" i="1"/>
+            <a:endParaRPr lang="en-US" i="1" dirty="0"/>
           </a:p>
           <a:p>
             <a:pPr marL="0" indent="0" algn="ctr">
               <a:buNone/>
             </a:pPr>
-            <a:endParaRPr lang="en-US" i="1"/>
+            <a:endParaRPr lang="en-US" i="1" dirty="0"/>
           </a:p>
           <a:p>
             <a:pPr marL="0" indent="0" algn="r">
@@ -17431,6 +17436,7 @@
               <a:rPr lang="en-US" i="1"/>
               <a:t>5 pts</a:t>
             </a:r>
+            <a:endParaRPr lang="en-US" i="1" dirty="0"/>
           </a:p>
         </p:txBody>
       </p:sp>

</xml_diff>